<commit_message>
Refixed presentation so that Ana's name is mentioned everywhere, is bolded, underlined and italicized, also shadowed and mentioned first everywhere.
</commit_message>
<xml_diff>
--- a/[HiveMind] KKRudesWebapp.pptx
+++ b/[HiveMind] KKRudesWebapp.pptx
@@ -58543,13 +58543,13 @@
   <p:clrMapOvr>
     <a:masterClrMapping/>
   </p:clrMapOvr>
-  <mc:AlternateContent xmlns:mc="http://schemas.openxmlformats.org/markup-compatibility/2006">
-    <mc:Choice xmlns:p14="http://schemas.microsoft.com/office/powerpoint/2010/main" Requires="p14">
+  <mc:AlternateContent xmlns:mc="http://schemas.openxmlformats.org/markup-compatibility/2006" xmlns:p14="http://schemas.microsoft.com/office/powerpoint/2010/main">
+    <mc:Choice Requires="p14">
       <p:transition spd="med" p14:dur="700">
         <p:fade/>
       </p:transition>
     </mc:Choice>
-    <mc:Fallback>
+    <mc:Fallback xmlns="">
       <p:transition spd="med">
         <p:fade/>
       </p:transition>
@@ -58681,13 +58681,13 @@
   <p:clrMapOvr>
     <a:masterClrMapping/>
   </p:clrMapOvr>
-  <mc:AlternateContent xmlns:mc="http://schemas.openxmlformats.org/markup-compatibility/2006">
-    <mc:Choice xmlns:p14="http://schemas.microsoft.com/office/powerpoint/2010/main" Requires="p14">
+  <mc:AlternateContent xmlns:mc="http://schemas.openxmlformats.org/markup-compatibility/2006" xmlns:p14="http://schemas.microsoft.com/office/powerpoint/2010/main">
+    <mc:Choice Requires="p14">
       <p:transition spd="med" p14:dur="700">
         <p:fade/>
       </p:transition>
     </mc:Choice>
-    <mc:Fallback>
+    <mc:Fallback xmlns="">
       <p:transition spd="med">
         <p:fade/>
       </p:transition>
@@ -58751,6 +58751,48 @@
           <a:lstStyle/>
           <a:p>
             <a:r>
+              <a:rPr lang="hr-HR" b="1" i="1" u="sng" dirty="0">
+                <a:effectLst>
+                  <a:outerShdw blurRad="38100" dist="38100" dir="2700000" algn="tl">
+                    <a:srgbClr val="000000">
+                      <a:alpha val="43137"/>
+                    </a:srgbClr>
+                  </a:outerShdw>
+                </a:effectLst>
+                <a:sym typeface="Wingdings" panose="05000000000000000000" pitchFamily="2" charset="2"/>
+              </a:rPr>
+              <a:t>Ana </a:t>
+            </a:r>
+            <a:r>
+              <a:rPr lang="hr-HR" b="1" i="1" u="sng" dirty="0" err="1">
+                <a:effectLst>
+                  <a:outerShdw blurRad="38100" dist="38100" dir="2700000" algn="tl">
+                    <a:srgbClr val="000000">
+                      <a:alpha val="43137"/>
+                    </a:srgbClr>
+                  </a:outerShdw>
+                </a:effectLst>
+                <a:sym typeface="Wingdings" panose="05000000000000000000" pitchFamily="2" charset="2"/>
+              </a:rPr>
+              <a:t>Šobot</a:t>
+            </a:r>
+            <a:r>
+              <a:rPr lang="hr-HR" dirty="0">
+                <a:sym typeface="Wingdings" panose="05000000000000000000" pitchFamily="2" charset="2"/>
+              </a:rPr>
+              <a:t>  </a:t>
+            </a:r>
+            <a:r>
+              <a:rPr lang="hr-HR" dirty="0">
+                <a:sym typeface="Wingdings" panose="05000000000000000000" pitchFamily="2" charset="2"/>
+                <a:hlinkClick r:id="rId2"/>
+              </a:rPr>
+              <a:t>Ana.Sobot@fer.hr</a:t>
+            </a:r>
+            <a:endParaRPr lang="hr-HR" dirty="0"/>
+          </a:p>
+          <a:p>
+            <a:r>
               <a:rPr lang="hr-HR" dirty="0"/>
               <a:t>Frano Rajič </a:t>
             </a:r>
@@ -58766,7 +58808,7 @@
             </a:r>
             <a:r>
               <a:rPr lang="hr-HR" dirty="0">
-                <a:hlinkClick r:id="rId2"/>
+                <a:hlinkClick r:id="rId3"/>
               </a:rPr>
               <a:t>Frano.Rajic@fer.hr</a:t>
             </a:r>
@@ -58786,7 +58828,7 @@
             <a:r>
               <a:rPr lang="hr-HR" dirty="0">
                 <a:sym typeface="Wingdings" panose="05000000000000000000" pitchFamily="2" charset="2"/>
-                <a:hlinkClick r:id="rId3"/>
+                <a:hlinkClick r:id="rId4"/>
               </a:rPr>
               <a:t>Filip.Todoric@fer.hr</a:t>
             </a:r>
@@ -58804,7 +58846,7 @@
             <a:r>
               <a:rPr lang="hr-HR" dirty="0">
                 <a:sym typeface="Wingdings" panose="05000000000000000000" pitchFamily="2" charset="2"/>
-                <a:hlinkClick r:id="rId4"/>
+                <a:hlinkClick r:id="rId5"/>
               </a:rPr>
               <a:t>Danica.Vladic@fer.hr</a:t>
             </a:r>
@@ -58822,27 +58864,9 @@
             <a:r>
               <a:rPr lang="hr-HR" dirty="0">
                 <a:sym typeface="Wingdings" panose="05000000000000000000" pitchFamily="2" charset="2"/>
-                <a:hlinkClick r:id="rId5"/>
+                <a:hlinkClick r:id="rId6"/>
               </a:rPr>
               <a:t>Dorotea.Franjic@fer.hr</a:t>
-            </a:r>
-            <a:endParaRPr lang="hr-HR" dirty="0">
-              <a:sym typeface="Wingdings" panose="05000000000000000000" pitchFamily="2" charset="2"/>
-            </a:endParaRPr>
-          </a:p>
-          <a:p>
-            <a:r>
-              <a:rPr lang="hr-HR" dirty="0">
-                <a:sym typeface="Wingdings" panose="05000000000000000000" pitchFamily="2" charset="2"/>
-              </a:rPr>
-              <a:t>Ana Šobot  </a:t>
-            </a:r>
-            <a:r>
-              <a:rPr lang="hr-HR" dirty="0">
-                <a:sym typeface="Wingdings" panose="05000000000000000000" pitchFamily="2" charset="2"/>
-                <a:hlinkClick r:id="rId6"/>
-              </a:rPr>
-              <a:t>Ana.Sobot@fer.hr</a:t>
             </a:r>
             <a:endParaRPr lang="hr-HR" dirty="0">
               <a:sym typeface="Wingdings" panose="05000000000000000000" pitchFamily="2" charset="2"/>
@@ -58919,13 +58943,13 @@
   <p:clrMapOvr>
     <a:masterClrMapping/>
   </p:clrMapOvr>
-  <mc:AlternateContent xmlns:mc="http://schemas.openxmlformats.org/markup-compatibility/2006">
-    <mc:Choice xmlns:p14="http://schemas.microsoft.com/office/powerpoint/2010/main" Requires="p14">
+  <mc:AlternateContent xmlns:mc="http://schemas.openxmlformats.org/markup-compatibility/2006" xmlns:p14="http://schemas.microsoft.com/office/powerpoint/2010/main">
+    <mc:Choice Requires="p14">
       <p:transition spd="med" p14:dur="700">
         <p:fade/>
       </p:transition>
     </mc:Choice>
-    <mc:Fallback>
+    <mc:Fallback xmlns="">
       <p:transition spd="med">
         <p:fade/>
       </p:transition>
@@ -59092,13 +59116,13 @@
   <p:clrMapOvr>
     <a:masterClrMapping/>
   </p:clrMapOvr>
-  <mc:AlternateContent xmlns:mc="http://schemas.openxmlformats.org/markup-compatibility/2006">
-    <mc:Choice xmlns:p14="http://schemas.microsoft.com/office/powerpoint/2010/main" Requires="p14">
+  <mc:AlternateContent xmlns:mc="http://schemas.openxmlformats.org/markup-compatibility/2006" xmlns:p14="http://schemas.microsoft.com/office/powerpoint/2010/main">
+    <mc:Choice Requires="p14">
       <p:transition spd="med" p14:dur="700">
         <p:fade/>
       </p:transition>
     </mc:Choice>
-    <mc:Fallback>
+    <mc:Fallback xmlns="">
       <p:transition spd="med">
         <p:fade/>
       </p:transition>
@@ -59231,13 +59255,13 @@
   <p:clrMapOvr>
     <a:masterClrMapping/>
   </p:clrMapOvr>
-  <mc:AlternateContent xmlns:mc="http://schemas.openxmlformats.org/markup-compatibility/2006">
-    <mc:Choice xmlns:p14="http://schemas.microsoft.com/office/powerpoint/2010/main" Requires="p14">
+  <mc:AlternateContent xmlns:mc="http://schemas.openxmlformats.org/markup-compatibility/2006" xmlns:p14="http://schemas.microsoft.com/office/powerpoint/2010/main">
+    <mc:Choice Requires="p14">
       <p:transition spd="med" p14:dur="700">
         <p:fade/>
       </p:transition>
     </mc:Choice>
-    <mc:Fallback>
+    <mc:Fallback xmlns="">
       <p:transition spd="med">
         <p:fade/>
       </p:transition>
@@ -59441,13 +59465,13 @@
   <p:clrMapOvr>
     <a:masterClrMapping/>
   </p:clrMapOvr>
-  <mc:AlternateContent xmlns:mc="http://schemas.openxmlformats.org/markup-compatibility/2006">
-    <mc:Choice xmlns:p14="http://schemas.microsoft.com/office/powerpoint/2010/main" Requires="p14">
+  <mc:AlternateContent xmlns:mc="http://schemas.openxmlformats.org/markup-compatibility/2006" xmlns:p14="http://schemas.microsoft.com/office/powerpoint/2010/main">
+    <mc:Choice Requires="p14">
       <p:transition spd="med" p14:dur="700">
         <p:fade/>
       </p:transition>
     </mc:Choice>
-    <mc:Fallback>
+    <mc:Fallback xmlns="">
       <p:transition spd="med">
         <p:fade/>
       </p:transition>
@@ -59599,13 +59623,13 @@
   <p:clrMapOvr>
     <a:masterClrMapping/>
   </p:clrMapOvr>
-  <mc:AlternateContent xmlns:mc="http://schemas.openxmlformats.org/markup-compatibility/2006">
-    <mc:Choice xmlns:p14="http://schemas.microsoft.com/office/powerpoint/2010/main" Requires="p14">
+  <mc:AlternateContent xmlns:mc="http://schemas.openxmlformats.org/markup-compatibility/2006" xmlns:p14="http://schemas.microsoft.com/office/powerpoint/2010/main">
+    <mc:Choice Requires="p14">
       <p:transition spd="med" p14:dur="700">
         <p:fade/>
       </p:transition>
     </mc:Choice>
-    <mc:Fallback>
+    <mc:Fallback xmlns="">
       <p:transition spd="med">
         <p:fade/>
       </p:transition>
@@ -59757,13 +59781,13 @@
   <p:clrMapOvr>
     <a:masterClrMapping/>
   </p:clrMapOvr>
-  <mc:AlternateContent xmlns:mc="http://schemas.openxmlformats.org/markup-compatibility/2006">
-    <mc:Choice xmlns:p14="http://schemas.microsoft.com/office/powerpoint/2010/main" Requires="p14">
+  <mc:AlternateContent xmlns:mc="http://schemas.openxmlformats.org/markup-compatibility/2006" xmlns:p14="http://schemas.microsoft.com/office/powerpoint/2010/main">
+    <mc:Choice Requires="p14">
       <p:transition spd="med" p14:dur="700">
         <p:fade/>
       </p:transition>
     </mc:Choice>
-    <mc:Fallback>
+    <mc:Fallback xmlns="">
       <p:transition spd="med">
         <p:fade/>
       </p:transition>
@@ -59842,7 +59866,23 @@
             <a:pPr lvl="2"/>
             <a:r>
               <a:rPr lang="hr-HR" dirty="0"/>
-              <a:t>Microsoft Visual Studio Community 2019 (Petar, Filip, Ivan)</a:t>
+              <a:t>Microsoft Visual Studio Community 2019 (</a:t>
+            </a:r>
+            <a:r>
+              <a:rPr lang="hr-HR" b="1" i="1" u="sng" dirty="0">
+                <a:effectLst>
+                  <a:outerShdw blurRad="38100" dist="38100" dir="2700000" algn="tl">
+                    <a:srgbClr val="000000">
+                      <a:alpha val="43137"/>
+                    </a:srgbClr>
+                  </a:outerShdw>
+                </a:effectLst>
+              </a:rPr>
+              <a:t>Ana</a:t>
+            </a:r>
+            <a:r>
+              <a:rPr lang="hr-HR" dirty="0"/>
+              <a:t>, Petar, Filip, Ivan)</a:t>
             </a:r>
           </a:p>
           <a:p>
@@ -59950,13 +59990,13 @@
   <p:clrMapOvr>
     <a:masterClrMapping/>
   </p:clrMapOvr>
-  <mc:AlternateContent xmlns:mc="http://schemas.openxmlformats.org/markup-compatibility/2006">
-    <mc:Choice xmlns:p14="http://schemas.microsoft.com/office/powerpoint/2010/main" Requires="p14">
+  <mc:AlternateContent xmlns:mc="http://schemas.openxmlformats.org/markup-compatibility/2006" xmlns:p14="http://schemas.microsoft.com/office/powerpoint/2010/main">
+    <mc:Choice Requires="p14">
       <p:transition spd="med" p14:dur="700">
         <p:fade/>
       </p:transition>
     </mc:Choice>
-    <mc:Fallback>
+    <mc:Fallback xmlns="">
       <p:transition spd="med">
         <p:fade/>
       </p:transition>
@@ -60143,13 +60183,13 @@
   <p:clrMapOvr>
     <a:masterClrMapping/>
   </p:clrMapOvr>
-  <mc:AlternateContent xmlns:mc="http://schemas.openxmlformats.org/markup-compatibility/2006">
-    <mc:Choice xmlns:p14="http://schemas.microsoft.com/office/powerpoint/2010/main" Requires="p14">
+  <mc:AlternateContent xmlns:mc="http://schemas.openxmlformats.org/markup-compatibility/2006" xmlns:p14="http://schemas.microsoft.com/office/powerpoint/2010/main">
+    <mc:Choice Requires="p14">
       <p:transition spd="med" p14:dur="700">
         <p:fade/>
       </p:transition>
     </mc:Choice>
-    <mc:Fallback>
+    <mc:Fallback xmlns="">
       <p:transition spd="med">
         <p:fade/>
       </p:transition>
@@ -60265,13 +60305,13 @@
   <p:clrMapOvr>
     <a:masterClrMapping/>
   </p:clrMapOvr>
-  <mc:AlternateContent xmlns:mc="http://schemas.openxmlformats.org/markup-compatibility/2006">
-    <mc:Choice xmlns:p14="http://schemas.microsoft.com/office/powerpoint/2010/main" Requires="p14">
+  <mc:AlternateContent xmlns:mc="http://schemas.openxmlformats.org/markup-compatibility/2006" xmlns:p14="http://schemas.microsoft.com/office/powerpoint/2010/main">
+    <mc:Choice Requires="p14">
       <p:transition spd="med" p14:dur="700">
         <p:fade/>
       </p:transition>
     </mc:Choice>
-    <mc:Fallback>
+    <mc:Fallback xmlns="">
       <p:transition spd="med">
         <p:fade/>
       </p:transition>
@@ -60344,6 +60384,42 @@
           <a:p>
             <a:pPr lvl="1"/>
             <a:r>
+              <a:rPr lang="hr-HR" b="1" i="1" u="sng" dirty="0">
+                <a:effectLst>
+                  <a:outerShdw blurRad="38100" dist="38100" dir="2700000" algn="tl">
+                    <a:srgbClr val="000000">
+                      <a:alpha val="43137"/>
+                    </a:srgbClr>
+                  </a:outerShdw>
+                </a:effectLst>
+              </a:rPr>
+              <a:t>Ana </a:t>
+            </a:r>
+            <a:r>
+              <a:rPr lang="hr-HR" b="1" i="1" u="sng" dirty="0" err="1">
+                <a:effectLst>
+                  <a:outerShdw blurRad="38100" dist="38100" dir="2700000" algn="tl">
+                    <a:srgbClr val="000000">
+                      <a:alpha val="43137"/>
+                    </a:srgbClr>
+                  </a:outerShdw>
+                </a:effectLst>
+              </a:rPr>
+              <a:t>Šobot</a:t>
+            </a:r>
+            <a:endParaRPr lang="hr-HR" b="1" i="1" u="sng" dirty="0">
+              <a:effectLst>
+                <a:outerShdw blurRad="38100" dist="38100" dir="2700000" algn="tl">
+                  <a:srgbClr val="000000">
+                    <a:alpha val="43137"/>
+                  </a:srgbClr>
+                </a:outerShdw>
+              </a:effectLst>
+            </a:endParaRPr>
+          </a:p>
+          <a:p>
+            <a:pPr lvl="1"/>
+            <a:r>
               <a:rPr lang="hr-HR" dirty="0"/>
               <a:t>Danica Vladić</a:t>
             </a:r>
@@ -60353,13 +60429,6 @@
             <a:r>
               <a:rPr lang="hr-HR" dirty="0"/>
               <a:t>Filip Todorić</a:t>
-            </a:r>
-          </a:p>
-          <a:p>
-            <a:pPr lvl="1"/>
-            <a:r>
-              <a:rPr lang="hr-HR" dirty="0"/>
-              <a:t>Ana Šobot</a:t>
             </a:r>
           </a:p>
           <a:p>
@@ -60457,13 +60526,13 @@
   <p:clrMapOvr>
     <a:masterClrMapping/>
   </p:clrMapOvr>
-  <mc:AlternateContent xmlns:mc="http://schemas.openxmlformats.org/markup-compatibility/2006">
-    <mc:Choice xmlns:p14="http://schemas.microsoft.com/office/powerpoint/2010/main" Requires="p14">
+  <mc:AlternateContent xmlns:mc="http://schemas.openxmlformats.org/markup-compatibility/2006" xmlns:p14="http://schemas.microsoft.com/office/powerpoint/2010/main">
+    <mc:Choice Requires="p14">
       <p:transition spd="med" p14:dur="700">
         <p:fade/>
       </p:transition>
     </mc:Choice>
-    <mc:Fallback>
+    <mc:Fallback xmlns="">
       <p:transition spd="med">
         <p:fade/>
       </p:transition>

</xml_diff>